<commit_message>
ItemRank 2 ver merged into ItemRank
</commit_message>
<xml_diff>
--- a/presentazione.pptx
+++ b/presentazione.pptx
@@ -13,9 +13,9 @@
     <p:sldId id="258" r:id="rId4"/>
     <p:sldId id="259" r:id="rId5"/>
     <p:sldId id="260" r:id="rId6"/>
-    <p:sldId id="261" r:id="rId7"/>
-    <p:sldId id="262" r:id="rId8"/>
-    <p:sldId id="263" r:id="rId9"/>
+    <p:sldId id="262" r:id="rId7"/>
+    <p:sldId id="263" r:id="rId8"/>
+    <p:sldId id="261" r:id="rId9"/>
     <p:sldId id="265" r:id="rId10"/>
     <p:sldId id="266" r:id="rId11"/>
     <p:sldId id="267" r:id="rId12"/>
@@ -209,7 +209,7 @@
           <a:p>
             <a:fld id="{994BE684-4DA4-4D52-B80B-EDFFF8A41124}" type="datetimeFigureOut">
               <a:rPr lang="it-IT" smtClean="0"/>
-              <a:t>03/01/2021</a:t>
+              <a:t>06/01/2021</a:t>
             </a:fld>
             <a:endParaRPr lang="it-IT"/>
           </a:p>
@@ -367,7 +367,7 @@
           <a:p>
             <a:fld id="{AC3624F0-F7CC-4313-944D-98184396DB88}" type="slidenum">
               <a:rPr lang="it-IT" smtClean="0"/>
-              <a:t>‹N›</a:t>
+              <a:t>‹#›</a:t>
             </a:fld>
             <a:endParaRPr lang="it-IT"/>
           </a:p>
@@ -645,7 +645,7 @@
           <a:p>
             <a:fld id="{B0987812-728B-47FA-AA9D-8AEA2237D5EC}" type="datetime1">
               <a:rPr lang="it-IT" smtClean="0"/>
-              <a:t>03/01/2021</a:t>
+              <a:t>06/01/2021</a:t>
             </a:fld>
             <a:endParaRPr lang="it-IT"/>
           </a:p>
@@ -716,7 +716,7 @@
           <a:p>
             <a:fld id="{DAB7ABF3-6289-4E10-AC32-6085271221DA}" type="slidenum">
               <a:rPr lang="it-IT" smtClean="0"/>
-              <a:t>‹N›</a:t>
+              <a:t>‹#›</a:t>
             </a:fld>
             <a:endParaRPr lang="it-IT"/>
           </a:p>
@@ -978,7 +978,7 @@
           <a:p>
             <a:fld id="{EF2EEFD7-6B21-44B4-BA33-D41A4A8D63B8}" type="datetime1">
               <a:rPr lang="it-IT" smtClean="0"/>
-              <a:t>03/01/2021</a:t>
+              <a:t>06/01/2021</a:t>
             </a:fld>
             <a:endParaRPr lang="it-IT"/>
           </a:p>
@@ -1023,7 +1023,7 @@
           <a:p>
             <a:fld id="{DAB7ABF3-6289-4E10-AC32-6085271221DA}" type="slidenum">
               <a:rPr lang="it-IT" smtClean="0"/>
-              <a:t>‹N›</a:t>
+              <a:t>‹#›</a:t>
             </a:fld>
             <a:endParaRPr lang="it-IT"/>
           </a:p>
@@ -1161,7 +1161,7 @@
           <a:p>
             <a:fld id="{8469A933-2519-478D-AEFE-55F2AFDF9845}" type="datetime1">
               <a:rPr lang="it-IT" smtClean="0"/>
-              <a:t>03/01/2021</a:t>
+              <a:t>06/01/2021</a:t>
             </a:fld>
             <a:endParaRPr lang="it-IT"/>
           </a:p>
@@ -1206,7 +1206,7 @@
           <a:p>
             <a:fld id="{DAB7ABF3-6289-4E10-AC32-6085271221DA}" type="slidenum">
               <a:rPr lang="it-IT" smtClean="0"/>
-              <a:t>‹N›</a:t>
+              <a:t>‹#›</a:t>
             </a:fld>
             <a:endParaRPr lang="it-IT"/>
           </a:p>
@@ -1334,7 +1334,7 @@
           <a:p>
             <a:fld id="{21B8ACC8-0A1F-479C-9977-6F73DEF200D4}" type="datetime1">
               <a:rPr lang="it-IT" smtClean="0"/>
-              <a:t>03/01/2021</a:t>
+              <a:t>06/01/2021</a:t>
             </a:fld>
             <a:endParaRPr lang="it-IT"/>
           </a:p>
@@ -1379,7 +1379,7 @@
           <a:p>
             <a:fld id="{DAB7ABF3-6289-4E10-AC32-6085271221DA}" type="slidenum">
               <a:rPr lang="it-IT" smtClean="0"/>
-              <a:t>‹N›</a:t>
+              <a:t>‹#›</a:t>
             </a:fld>
             <a:endParaRPr lang="it-IT"/>
           </a:p>
@@ -1614,7 +1614,7 @@
           <a:p>
             <a:fld id="{13DBCEE8-50D8-4EF2-8985-E4228D5D9E1F}" type="datetime1">
               <a:rPr lang="it-IT" smtClean="0"/>
-              <a:t>03/01/2021</a:t>
+              <a:t>06/01/2021</a:t>
             </a:fld>
             <a:endParaRPr lang="it-IT"/>
           </a:p>
@@ -1685,7 +1685,7 @@
           <a:p>
             <a:fld id="{DAB7ABF3-6289-4E10-AC32-6085271221DA}" type="slidenum">
               <a:rPr lang="it-IT" smtClean="0"/>
-              <a:t>‹N›</a:t>
+              <a:t>‹#›</a:t>
             </a:fld>
             <a:endParaRPr lang="it-IT"/>
           </a:p>
@@ -2011,7 +2011,7 @@
           <a:p>
             <a:fld id="{30B663B0-5B89-4794-8152-57B58F302E1C}" type="datetime1">
               <a:rPr lang="it-IT" smtClean="0"/>
-              <a:t>03/01/2021</a:t>
+              <a:t>06/01/2021</a:t>
             </a:fld>
             <a:endParaRPr lang="it-IT"/>
           </a:p>
@@ -2056,7 +2056,7 @@
           <a:p>
             <a:fld id="{DAB7ABF3-6289-4E10-AC32-6085271221DA}" type="slidenum">
               <a:rPr lang="it-IT" smtClean="0"/>
-              <a:t>‹N›</a:t>
+              <a:t>‹#›</a:t>
             </a:fld>
             <a:endParaRPr lang="it-IT"/>
           </a:p>
@@ -2491,7 +2491,7 @@
           <a:p>
             <a:fld id="{56C88E20-28C8-499C-9970-87D902D82CEE}" type="datetime1">
               <a:rPr lang="it-IT" smtClean="0"/>
-              <a:t>03/01/2021</a:t>
+              <a:t>06/01/2021</a:t>
             </a:fld>
             <a:endParaRPr lang="it-IT"/>
           </a:p>
@@ -2536,7 +2536,7 @@
           <a:p>
             <a:fld id="{DAB7ABF3-6289-4E10-AC32-6085271221DA}" type="slidenum">
               <a:rPr lang="it-IT" smtClean="0"/>
-              <a:t>‹N›</a:t>
+              <a:t>‹#›</a:t>
             </a:fld>
             <a:endParaRPr lang="it-IT"/>
           </a:p>
@@ -2612,7 +2612,7 @@
           <a:p>
             <a:fld id="{E43492BC-78F2-43C5-B188-AFD92A7606DE}" type="datetime1">
               <a:rPr lang="it-IT" smtClean="0"/>
-              <a:t>03/01/2021</a:t>
+              <a:t>06/01/2021</a:t>
             </a:fld>
             <a:endParaRPr lang="it-IT"/>
           </a:p>
@@ -2657,7 +2657,7 @@
           <a:p>
             <a:fld id="{DAB7ABF3-6289-4E10-AC32-6085271221DA}" type="slidenum">
               <a:rPr lang="it-IT" smtClean="0"/>
-              <a:t>‹N›</a:t>
+              <a:t>‹#›</a:t>
             </a:fld>
             <a:endParaRPr lang="it-IT"/>
           </a:p>
@@ -2710,7 +2710,7 @@
           <a:p>
             <a:fld id="{5F261AFB-674B-4492-90E2-05FFB1C443D7}" type="datetime1">
               <a:rPr lang="it-IT" smtClean="0"/>
-              <a:t>03/01/2021</a:t>
+              <a:t>06/01/2021</a:t>
             </a:fld>
             <a:endParaRPr lang="it-IT"/>
           </a:p>
@@ -2755,7 +2755,7 @@
           <a:p>
             <a:fld id="{DAB7ABF3-6289-4E10-AC32-6085271221DA}" type="slidenum">
               <a:rPr lang="it-IT" smtClean="0"/>
-              <a:t>‹N›</a:t>
+              <a:t>‹#›</a:t>
             </a:fld>
             <a:endParaRPr lang="it-IT"/>
           </a:p>
@@ -3059,7 +3059,7 @@
           <a:p>
             <a:fld id="{009B8EBE-D7F5-4208-8506-720407E2B9FE}" type="datetime1">
               <a:rPr lang="it-IT" smtClean="0"/>
-              <a:t>03/01/2021</a:t>
+              <a:t>06/01/2021</a:t>
             </a:fld>
             <a:endParaRPr lang="it-IT"/>
           </a:p>
@@ -3130,7 +3130,7 @@
           <a:p>
             <a:fld id="{DAB7ABF3-6289-4E10-AC32-6085271221DA}" type="slidenum">
               <a:rPr lang="it-IT" smtClean="0"/>
-              <a:t>‹N›</a:t>
+              <a:t>‹#›</a:t>
             </a:fld>
             <a:endParaRPr lang="it-IT"/>
           </a:p>
@@ -3450,7 +3450,7 @@
           <a:p>
             <a:fld id="{D20A9EF8-DE53-4773-9365-60EF8FC0FA68}" type="datetime1">
               <a:rPr lang="it-IT" smtClean="0"/>
-              <a:t>03/01/2021</a:t>
+              <a:t>06/01/2021</a:t>
             </a:fld>
             <a:endParaRPr lang="it-IT"/>
           </a:p>
@@ -3521,7 +3521,7 @@
           <a:p>
             <a:fld id="{DAB7ABF3-6289-4E10-AC32-6085271221DA}" type="slidenum">
               <a:rPr lang="it-IT" smtClean="0"/>
-              <a:t>‹N›</a:t>
+              <a:t>‹#›</a:t>
             </a:fld>
             <a:endParaRPr lang="it-IT"/>
           </a:p>
@@ -3731,7 +3731,7 @@
           <a:p>
             <a:fld id="{09418E75-61BA-4BFA-AFAA-097C069C209E}" type="datetime1">
               <a:rPr lang="it-IT" smtClean="0"/>
-              <a:t>03/01/2021</a:t>
+              <a:t>06/01/2021</a:t>
             </a:fld>
             <a:endParaRPr lang="it-IT"/>
           </a:p>
@@ -3808,7 +3808,7 @@
           <a:p>
             <a:fld id="{DAB7ABF3-6289-4E10-AC32-6085271221DA}" type="slidenum">
               <a:rPr lang="it-IT" smtClean="0"/>
-              <a:t>‹N›</a:t>
+              <a:t>‹#›</a:t>
             </a:fld>
             <a:endParaRPr lang="it-IT"/>
           </a:p>
@@ -6974,6 +6974,253 @@
 <file path=ppt/slides/slide6.xml><?xml version="1.0" encoding="utf-8"?>
 <p:sld xmlns:a="http://schemas.openxmlformats.org/drawingml/2006/main" xmlns:r="http://schemas.openxmlformats.org/officeDocument/2006/relationships" xmlns:p="http://schemas.openxmlformats.org/presentationml/2006/main">
   <p:cSld>
+    <p:spTree>
+      <p:nvGrpSpPr>
+        <p:cNvPr id="1" name=""/>
+        <p:cNvGrpSpPr/>
+        <p:nvPr/>
+      </p:nvGrpSpPr>
+      <p:grpSpPr>
+        <a:xfrm>
+          <a:off x="0" y="0"/>
+          <a:ext cx="0" cy="0"/>
+          <a:chOff x="0" y="0"/>
+          <a:chExt cx="0" cy="0"/>
+        </a:xfrm>
+      </p:grpSpPr>
+      <p:sp>
+        <p:nvSpPr>
+          <p:cNvPr id="2" name="Titolo 1">
+            <a:extLst>
+              <a:ext uri="{FF2B5EF4-FFF2-40B4-BE49-F238E27FC236}">
+                <a16:creationId xmlns:a16="http://schemas.microsoft.com/office/drawing/2014/main" id="{238B2D5E-DD10-453A-AF76-4ABCED915F4B}"/>
+              </a:ext>
+            </a:extLst>
+          </p:cNvPr>
+          <p:cNvSpPr>
+            <a:spLocks noGrp="1"/>
+          </p:cNvSpPr>
+          <p:nvPr>
+            <p:ph type="title"/>
+          </p:nvPr>
+        </p:nvSpPr>
+        <p:spPr/>
+        <p:txBody>
+          <a:bodyPr/>
+          <a:lstStyle/>
+          <a:p>
+            <a:r>
+              <a:rPr lang="it-IT" dirty="0"/>
+              <a:t>La media di </a:t>
+            </a:r>
+            <a:r>
+              <a:rPr lang="it-IT" dirty="0" err="1"/>
+              <a:t>Bayes</a:t>
+            </a:r>
+            <a:endParaRPr lang="it-IT" dirty="0"/>
+          </a:p>
+        </p:txBody>
+      </p:sp>
+      <p:sp>
+        <p:nvSpPr>
+          <p:cNvPr id="4" name="Segnaposto piè di pagina 3">
+            <a:extLst>
+              <a:ext uri="{FF2B5EF4-FFF2-40B4-BE49-F238E27FC236}">
+                <a16:creationId xmlns:a16="http://schemas.microsoft.com/office/drawing/2014/main" id="{8C6EC825-8141-41C7-9311-6C7513C0EDE9}"/>
+              </a:ext>
+            </a:extLst>
+          </p:cNvPr>
+          <p:cNvSpPr>
+            <a:spLocks noGrp="1"/>
+          </p:cNvSpPr>
+          <p:nvPr>
+            <p:ph type="ftr" sz="quarter" idx="11"/>
+          </p:nvPr>
+        </p:nvSpPr>
+        <p:spPr/>
+        <p:txBody>
+          <a:bodyPr/>
+          <a:lstStyle/>
+          <a:p>
+            <a:r>
+              <a:rPr lang="it-IT"/>
+              <a:t>Andrea Foroni, Marco Morandi, Prabin Pellicioli</a:t>
+            </a:r>
+          </a:p>
+        </p:txBody>
+      </p:sp>
+      <p:sp>
+        <p:nvSpPr>
+          <p:cNvPr id="5" name="Segnaposto numero diapositiva 4">
+            <a:extLst>
+              <a:ext uri="{FF2B5EF4-FFF2-40B4-BE49-F238E27FC236}">
+                <a16:creationId xmlns:a16="http://schemas.microsoft.com/office/drawing/2014/main" id="{0208920B-A89F-4037-9568-4FCCF69DC953}"/>
+              </a:ext>
+            </a:extLst>
+          </p:cNvPr>
+          <p:cNvSpPr>
+            <a:spLocks noGrp="1"/>
+          </p:cNvSpPr>
+          <p:nvPr>
+            <p:ph type="sldNum" sz="quarter" idx="12"/>
+          </p:nvPr>
+        </p:nvSpPr>
+        <p:spPr/>
+        <p:txBody>
+          <a:bodyPr/>
+          <a:lstStyle/>
+          <a:p>
+            <a:fld id="{DAB7ABF3-6289-4E10-AC32-6085271221DA}" type="slidenum">
+              <a:rPr lang="it-IT" smtClean="0"/>
+              <a:t>6</a:t>
+            </a:fld>
+            <a:endParaRPr lang="it-IT"/>
+          </a:p>
+        </p:txBody>
+      </p:sp>
+      <p:pic>
+        <p:nvPicPr>
+          <p:cNvPr id="30" name="Segnaposto contenuto 29" descr="Immagine che contiene testo&#10;&#10;Descrizione generata automaticamente">
+            <a:extLst>
+              <a:ext uri="{FF2B5EF4-FFF2-40B4-BE49-F238E27FC236}">
+                <a16:creationId xmlns:a16="http://schemas.microsoft.com/office/drawing/2014/main" id="{F1972ED6-6023-4E88-ACAF-48E277E26E39}"/>
+              </a:ext>
+            </a:extLst>
+          </p:cNvPr>
+          <p:cNvPicPr>
+            <a:picLocks noGrp="1" noChangeAspect="1"/>
+          </p:cNvPicPr>
+          <p:nvPr>
+            <p:ph idx="1"/>
+          </p:nvPr>
+        </p:nvPicPr>
+        <p:blipFill>
+          <a:blip r:embed="rId2">
+            <a:extLst>
+              <a:ext uri="{28A0092B-C50C-407E-A947-70E740481C1C}">
+                <a14:useLocalDpi xmlns:a14="http://schemas.microsoft.com/office/drawing/2010/main" val="0"/>
+              </a:ext>
+            </a:extLst>
+          </a:blip>
+          <a:stretch>
+            <a:fillRect/>
+          </a:stretch>
+        </p:blipFill>
+        <p:spPr>
+          <a:xfrm>
+            <a:off x="4814887" y="1828800"/>
+            <a:ext cx="2562225" cy="685800"/>
+          </a:xfrm>
+        </p:spPr>
+      </p:pic>
+      <p:sp>
+        <p:nvSpPr>
+          <p:cNvPr id="31" name="CasellaDiTesto 30">
+            <a:extLst>
+              <a:ext uri="{FF2B5EF4-FFF2-40B4-BE49-F238E27FC236}">
+                <a16:creationId xmlns:a16="http://schemas.microsoft.com/office/drawing/2014/main" id="{4DCFF8F9-6E11-4341-8772-C096E3B26B94}"/>
+              </a:ext>
+            </a:extLst>
+          </p:cNvPr>
+          <p:cNvSpPr txBox="1"/>
+          <p:nvPr/>
+        </p:nvSpPr>
+        <p:spPr>
+          <a:xfrm>
+            <a:off x="1371600" y="2912013"/>
+            <a:ext cx="10592578" cy="2862322"/>
+          </a:xfrm>
+          <a:prstGeom prst="rect">
+            <a:avLst/>
+          </a:prstGeom>
+          <a:noFill/>
+        </p:spPr>
+        <p:txBody>
+          <a:bodyPr wrap="square" rtlCol="0">
+            <a:spAutoFit/>
+          </a:bodyPr>
+          <a:lstStyle/>
+          <a:p>
+            <a:r>
+              <a:rPr lang="it-IT" dirty="0"/>
+              <a:t>C = confidence (è il minimo numero di commenti che rende affidabile la valutazione)</a:t>
+            </a:r>
+          </a:p>
+          <a:p>
+            <a:r>
+              <a:rPr lang="it-IT" dirty="0"/>
+              <a:t>m = </a:t>
+            </a:r>
+            <a:r>
+              <a:rPr lang="it-IT" dirty="0" err="1"/>
+              <a:t>prior</a:t>
+            </a:r>
+            <a:r>
+              <a:rPr lang="it-IT" dirty="0"/>
+              <a:t> (è il voto medio scelto a priori che ci si aspetta nel dataset)</a:t>
+            </a:r>
+          </a:p>
+          <a:p>
+            <a:r>
+              <a:rPr lang="it-IT" dirty="0"/>
+              <a:t>N = numero di commenti</a:t>
+            </a:r>
+          </a:p>
+          <a:p>
+            <a:endParaRPr lang="it-IT" dirty="0"/>
+          </a:p>
+          <a:p>
+            <a:r>
+              <a:rPr lang="it-IT" dirty="0"/>
+              <a:t>Con la media di </a:t>
+            </a:r>
+            <a:r>
+              <a:rPr lang="it-IT" dirty="0" err="1"/>
+              <a:t>Bayes</a:t>
+            </a:r>
+            <a:r>
+              <a:rPr lang="it-IT" dirty="0"/>
+              <a:t> se il numero di commenti è minore di C, la media osservata è fortemente influenzata da m (</a:t>
+            </a:r>
+            <a:r>
+              <a:rPr lang="it-IT" dirty="0" err="1"/>
+              <a:t>prior</a:t>
+            </a:r>
+            <a:r>
+              <a:rPr lang="it-IT" dirty="0"/>
+              <a:t>) se invece è maggiore, la media osservata è più importante.</a:t>
+            </a:r>
+          </a:p>
+          <a:p>
+            <a:r>
+              <a:rPr lang="it-IT" dirty="0"/>
+              <a:t>Per fare in modo che la media sia veritiera bisogna scegliere accuratamente C e m, per il nostro ranking è stato scelto C=30; m=6.3</a:t>
+            </a:r>
+          </a:p>
+          <a:p>
+            <a:endParaRPr lang="it-IT" dirty="0"/>
+          </a:p>
+          <a:p>
+            <a:endParaRPr lang="it-IT" dirty="0"/>
+          </a:p>
+        </p:txBody>
+      </p:sp>
+    </p:spTree>
+    <p:extLst>
+      <p:ext uri="{BB962C8B-B14F-4D97-AF65-F5344CB8AC3E}">
+        <p14:creationId xmlns:p14="http://schemas.microsoft.com/office/powerpoint/2010/main" val="3799362411"/>
+      </p:ext>
+    </p:extLst>
+  </p:cSld>
+  <p:clrMapOvr>
+    <a:masterClrMapping/>
+  </p:clrMapOvr>
+</p:sld>
+</file>
+
+<file path=ppt/slides/slide7.xml><?xml version="1.0" encoding="utf-8"?>
+<p:sld xmlns:a="http://schemas.openxmlformats.org/drawingml/2006/main" xmlns:r="http://schemas.openxmlformats.org/officeDocument/2006/relationships" xmlns:p="http://schemas.openxmlformats.org/presentationml/2006/main">
+  <p:cSld>
     <p:bg>
       <p:bgPr>
         <a:solidFill>
@@ -7001,7 +7248,7 @@
           <p:cNvPr id="2" name="Titolo 1">
             <a:extLst>
               <a:ext uri="{FF2B5EF4-FFF2-40B4-BE49-F238E27FC236}">
-                <a16:creationId xmlns:a16="http://schemas.microsoft.com/office/drawing/2014/main" id="{73181F96-ED8F-4515-BC2B-D072B682922D}"/>
+                <a16:creationId xmlns:a16="http://schemas.microsoft.com/office/drawing/2014/main" id="{5B345DEA-7D85-4715-9B4D-A787A114128A}"/>
               </a:ext>
             </a:extLst>
           </p:cNvPr>
@@ -7025,14 +7272,14 @@
           <a:lstStyle/>
           <a:p>
             <a:r>
-              <a:rPr lang="it-IT" sz="4100" dirty="0"/>
-              <a:t>Ranking con media di </a:t>
-            </a:r>
-            <a:r>
-              <a:rPr lang="it-IT" sz="4100" dirty="0" err="1"/>
-              <a:t>Bayes</a:t>
-            </a:r>
-            <a:endParaRPr lang="it-IT" sz="4100" dirty="0"/>
+              <a:rPr lang="it-IT" sz="3400"/>
+              <a:t>Scelta della confidence e </a:t>
+            </a:r>
+            <a:r>
+              <a:rPr lang="it-IT" sz="3400" err="1"/>
+              <a:t>prior</a:t>
+            </a:r>
+            <a:endParaRPr lang="it-IT" sz="3400"/>
           </a:p>
         </p:txBody>
       </p:sp>
@@ -7093,10 +7340,10 @@
       </p:sp>
       <p:pic>
         <p:nvPicPr>
-          <p:cNvPr id="7" name="Segnaposto contenuto 6" descr="Immagine che contiene tavolo&#10;&#10;Descrizione generata automaticamente">
+          <p:cNvPr id="7" name="Segnaposto contenuto 6">
             <a:extLst>
               <a:ext uri="{FF2B5EF4-FFF2-40B4-BE49-F238E27FC236}">
-                <a16:creationId xmlns:a16="http://schemas.microsoft.com/office/drawing/2014/main" id="{012DD890-49DD-4C8D-9105-4E8280BBC5E8}"/>
+                <a16:creationId xmlns:a16="http://schemas.microsoft.com/office/drawing/2014/main" id="{488EFED7-8438-44DC-974B-85E5AA36BA70}"/>
               </a:ext>
             </a:extLst>
           </p:cNvPr>
@@ -7119,8 +7366,8 @@
         </p:blipFill>
         <p:spPr>
           <a:xfrm>
-            <a:off x="1023561" y="1158999"/>
-            <a:ext cx="6517065" cy="4219961"/>
+            <a:off x="1023561" y="1102357"/>
+            <a:ext cx="6517065" cy="4333245"/>
           </a:xfrm>
           <a:prstGeom prst="rect">
             <a:avLst/>
@@ -7132,7 +7379,7 @@
           <p:cNvPr id="11" name="Content Placeholder 10">
             <a:extLst>
               <a:ext uri="{FF2B5EF4-FFF2-40B4-BE49-F238E27FC236}">
-                <a16:creationId xmlns:a16="http://schemas.microsoft.com/office/drawing/2014/main" id="{ED706131-CF59-481C-AD37-922B3DE30C3B}"/>
+                <a16:creationId xmlns:a16="http://schemas.microsoft.com/office/drawing/2014/main" id="{81A25C7D-4D64-46A2-8CBF-D0C35C3D145D}"/>
               </a:ext>
             </a:extLst>
           </p:cNvPr>
@@ -7145,13 +7392,13 @@
         </p:nvSpPr>
         <p:spPr>
           <a:xfrm>
-            <a:off x="7860667" y="2286000"/>
-            <a:ext cx="3656419" cy="3581400"/>
+            <a:off x="7857492" y="1989085"/>
+            <a:ext cx="3656419" cy="3955409"/>
           </a:xfrm>
         </p:spPr>
         <p:txBody>
           <a:bodyPr>
-            <a:normAutofit/>
+            <a:noAutofit/>
           </a:bodyPr>
           <a:lstStyle/>
           <a:p>
@@ -7159,159 +7406,270 @@
               <a:buNone/>
             </a:pPr>
             <a:r>
-              <a:rPr lang="en-US" dirty="0"/>
-              <a:t>Con </a:t>
-            </a:r>
-            <a:r>
-              <a:rPr lang="en-US" dirty="0" err="1"/>
-              <a:t>questo</a:t>
-            </a:r>
-            <a:r>
-              <a:rPr lang="en-US" dirty="0"/>
+              <a:rPr lang="en-US" sz="1700" dirty="0"/>
+              <a:t>La </a:t>
+            </a:r>
+            <a:r>
+              <a:rPr lang="en-US" sz="1700" dirty="0" err="1"/>
+              <a:t>scelta</a:t>
+            </a:r>
+            <a:r>
+              <a:rPr lang="en-US" sz="1700" dirty="0"/>
+              <a:t> è </a:t>
+            </a:r>
+            <a:r>
+              <a:rPr lang="en-US" sz="1700" dirty="0" err="1"/>
+              <a:t>stata</a:t>
+            </a:r>
+            <a:r>
+              <a:rPr lang="en-US" sz="1700" dirty="0"/>
               <a:t> </a:t>
             </a:r>
             <a:r>
-              <a:rPr lang="en-US" dirty="0" err="1"/>
-              <a:t>metodo</a:t>
-            </a:r>
-            <a:r>
-              <a:rPr lang="en-US" dirty="0"/>
+              <a:rPr lang="en-US" sz="1700" dirty="0" err="1"/>
+              <a:t>fatta</a:t>
+            </a:r>
+            <a:r>
+              <a:rPr lang="en-US" sz="1700" dirty="0"/>
               <a:t> </a:t>
             </a:r>
             <a:r>
-              <a:rPr lang="en-US" dirty="0" err="1"/>
-              <a:t>si</a:t>
-            </a:r>
-            <a:r>
-              <a:rPr lang="en-US" dirty="0"/>
+              <a:rPr lang="en-US" sz="1700" dirty="0" err="1"/>
+              <a:t>utilizzando</a:t>
+            </a:r>
+            <a:r>
+              <a:rPr lang="en-US" sz="1700" dirty="0"/>
+              <a:t> il </a:t>
+            </a:r>
+            <a:r>
+              <a:rPr lang="en-US" sz="1700" dirty="0" err="1"/>
+              <a:t>grafico</a:t>
+            </a:r>
+            <a:r>
+              <a:rPr lang="en-US" sz="1700" dirty="0"/>
+              <a:t> di </a:t>
+            </a:r>
+            <a:r>
+              <a:rPr lang="en-US" sz="1700" dirty="0" err="1"/>
+              <a:t>frequenza</a:t>
+            </a:r>
+            <a:r>
+              <a:rPr lang="en-US" sz="1700" dirty="0"/>
               <a:t> </a:t>
             </a:r>
             <a:r>
-              <a:rPr lang="en-US" dirty="0" err="1"/>
-              <a:t>considerano</a:t>
-            </a:r>
-            <a:r>
-              <a:rPr lang="en-US" dirty="0"/>
+              <a:rPr lang="en-US" sz="1700" dirty="0" err="1"/>
+              <a:t>delle</a:t>
+            </a:r>
+            <a:r>
+              <a:rPr lang="en-US" sz="1700" dirty="0"/>
               <a:t> </a:t>
             </a:r>
             <a:r>
-              <a:rPr lang="en-US" dirty="0" err="1"/>
-              <a:t>sia</a:t>
-            </a:r>
-            <a:r>
-              <a:rPr lang="en-US" dirty="0"/>
+              <a:rPr lang="en-US" sz="1700" dirty="0" err="1"/>
+              <a:t>medie</a:t>
+            </a:r>
+            <a:r>
+              <a:rPr lang="en-US" sz="1700" dirty="0"/>
               <a:t> </a:t>
             </a:r>
             <a:r>
-              <a:rPr lang="en-US" dirty="0" err="1"/>
-              <a:t>i</a:t>
-            </a:r>
-            <a:r>
-              <a:rPr lang="en-US" dirty="0"/>
-              <a:t> rating </a:t>
-            </a:r>
-            <a:r>
-              <a:rPr lang="en-US" dirty="0" err="1"/>
+              <a:rPr lang="en-US" sz="1700" dirty="0" err="1"/>
               <a:t>dei</a:t>
             </a:r>
             <a:r>
-              <a:rPr lang="en-US" dirty="0"/>
+              <a:rPr lang="en-US" sz="1700" dirty="0"/>
+              <a:t> rating in base ai </a:t>
+            </a:r>
+            <a:r>
+              <a:rPr lang="en-US" sz="1700" dirty="0" err="1"/>
+              <a:t>giochi</a:t>
+            </a:r>
+            <a:r>
+              <a:rPr lang="en-US" sz="1700" dirty="0"/>
+              <a:t>.</a:t>
+            </a:r>
+          </a:p>
+          <a:p>
+            <a:pPr marL="0" indent="0">
+              <a:buNone/>
+            </a:pPr>
+            <a:r>
+              <a:rPr lang="en-US" sz="1700" dirty="0" err="1"/>
+              <a:t>Sull’asse</a:t>
+            </a:r>
+            <a:r>
+              <a:rPr lang="en-US" sz="1700" dirty="0"/>
+              <a:t> x il </a:t>
+            </a:r>
+            <a:r>
+              <a:rPr lang="en-US" sz="1700" dirty="0" err="1"/>
+              <a:t>numero</a:t>
+            </a:r>
+            <a:r>
+              <a:rPr lang="en-US" sz="1700" dirty="0"/>
+              <a:t> di </a:t>
+            </a:r>
+            <a:r>
+              <a:rPr lang="en-US" sz="1700" dirty="0" err="1"/>
+              <a:t>recensioni</a:t>
+            </a:r>
+            <a:r>
+              <a:rPr lang="en-US" sz="1700" dirty="0"/>
+              <a:t>.</a:t>
+            </a:r>
+          </a:p>
+          <a:p>
+            <a:pPr marL="0" indent="0">
+              <a:buNone/>
+            </a:pPr>
+            <a:r>
+              <a:rPr lang="en-US" sz="1700" dirty="0" err="1"/>
+              <a:t>Sull’asse</a:t>
+            </a:r>
+            <a:r>
+              <a:rPr lang="en-US" sz="1700" dirty="0"/>
+              <a:t> y il </a:t>
+            </a:r>
+            <a:r>
+              <a:rPr lang="en-US" sz="1700" dirty="0" err="1"/>
+              <a:t>numero</a:t>
+            </a:r>
+            <a:r>
+              <a:rPr lang="en-US" sz="1700" dirty="0"/>
+              <a:t> di </a:t>
+            </a:r>
+            <a:r>
+              <a:rPr lang="en-US" sz="1700" dirty="0" err="1"/>
+              <a:t>voti</a:t>
+            </a:r>
+            <a:r>
+              <a:rPr lang="en-US" sz="1700" dirty="0"/>
               <a:t> </a:t>
             </a:r>
             <a:r>
-              <a:rPr lang="en-US" dirty="0" err="1"/>
-              <a:t>giochi</a:t>
-            </a:r>
-            <a:r>
-              <a:rPr lang="en-US" dirty="0"/>
+              <a:rPr lang="en-US" sz="1700" dirty="0" err="1"/>
+              <a:t>delle</a:t>
+            </a:r>
+            <a:r>
+              <a:rPr lang="en-US" sz="1700" dirty="0"/>
               <a:t> </a:t>
             </a:r>
             <a:r>
-              <a:rPr lang="en-US" dirty="0" err="1"/>
-              <a:t>che</a:t>
-            </a:r>
-            <a:r>
-              <a:rPr lang="en-US" dirty="0"/>
-              <a:t> la </a:t>
-            </a:r>
-            <a:r>
-              <a:rPr lang="en-US" dirty="0" err="1"/>
-              <a:t>numerosità</a:t>
-            </a:r>
-            <a:r>
-              <a:rPr lang="en-US" dirty="0"/>
+              <a:rPr lang="en-US" sz="1700" dirty="0" err="1"/>
+              <a:t>recensioni</a:t>
+            </a:r>
+            <a:r>
+              <a:rPr lang="en-US" sz="1700" dirty="0"/>
+              <a:t>.</a:t>
+            </a:r>
+          </a:p>
+          <a:p>
+            <a:pPr marL="0" indent="0">
+              <a:buNone/>
+            </a:pPr>
+            <a:r>
+              <a:rPr lang="en-US" sz="1700" dirty="0" err="1"/>
+              <a:t>Gli</a:t>
+            </a:r>
+            <a:r>
+              <a:rPr lang="en-US" sz="1700" dirty="0"/>
               <a:t> </a:t>
             </a:r>
             <a:r>
-              <a:rPr lang="en-US" dirty="0" err="1"/>
-              <a:t>dei</a:t>
-            </a:r>
-            <a:r>
-              <a:rPr lang="en-US" dirty="0"/>
+              <a:rPr lang="en-US" sz="1700" dirty="0" err="1"/>
+              <a:t>esagoni</a:t>
+            </a:r>
+            <a:r>
+              <a:rPr lang="en-US" sz="1700" dirty="0"/>
               <a:t> </a:t>
             </a:r>
             <a:r>
-              <a:rPr lang="en-US" dirty="0" err="1"/>
-              <a:t>commenti</a:t>
-            </a:r>
-            <a:r>
-              <a:rPr lang="en-US" dirty="0"/>
-              <a:t>, </a:t>
-            </a:r>
-            <a:r>
-              <a:rPr lang="en-US" dirty="0" err="1"/>
-              <a:t>risultando</a:t>
-            </a:r>
-            <a:r>
-              <a:rPr lang="en-US" dirty="0"/>
+              <a:rPr lang="en-US" sz="1700" dirty="0" err="1"/>
+              <a:t>vanno</a:t>
+            </a:r>
+            <a:r>
+              <a:rPr lang="en-US" sz="1700" dirty="0"/>
+              <a:t> dal </a:t>
+            </a:r>
+            <a:r>
+              <a:rPr lang="en-US" sz="1700" dirty="0" err="1"/>
+              <a:t>giallo</a:t>
+            </a:r>
+            <a:r>
+              <a:rPr lang="en-US" sz="1700" dirty="0"/>
+              <a:t> al </a:t>
+            </a:r>
+            <a:r>
+              <a:rPr lang="en-US" sz="1700" dirty="0" err="1"/>
+              <a:t>verde</a:t>
+            </a:r>
+            <a:r>
+              <a:rPr lang="en-US" sz="1700" dirty="0"/>
+              <a:t> al </a:t>
+            </a:r>
+            <a:r>
+              <a:rPr lang="en-US" sz="1700" dirty="0" err="1"/>
+              <a:t>blu</a:t>
+            </a:r>
+            <a:r>
+              <a:rPr lang="en-US" sz="1700" dirty="0"/>
+              <a:t> e il </a:t>
+            </a:r>
+            <a:r>
+              <a:rPr lang="en-US" sz="1700" dirty="0" err="1"/>
+              <a:t>colore</a:t>
+            </a:r>
+            <a:r>
+              <a:rPr lang="en-US" sz="1700" dirty="0"/>
               <a:t> </a:t>
             </a:r>
             <a:r>
-              <a:rPr lang="en-US" dirty="0" err="1"/>
-              <a:t>così</a:t>
-            </a:r>
-            <a:r>
-              <a:rPr lang="en-US" dirty="0"/>
+              <a:rPr lang="en-US" sz="1700" dirty="0" err="1"/>
+              <a:t>diventa</a:t>
+            </a:r>
+            <a:r>
+              <a:rPr lang="en-US" sz="1700" dirty="0"/>
               <a:t> </a:t>
             </a:r>
             <a:r>
-              <a:rPr lang="en-US" dirty="0" err="1"/>
+              <a:rPr lang="en-US" sz="1700" dirty="0" err="1"/>
               <a:t>più</a:t>
             </a:r>
             <a:r>
-              <a:rPr lang="en-US" dirty="0"/>
+              <a:rPr lang="en-US" sz="1700" dirty="0"/>
               <a:t> </a:t>
             </a:r>
             <a:r>
-              <a:rPr lang="en-US" dirty="0" err="1"/>
-              <a:t>accettabile</a:t>
-            </a:r>
-            <a:r>
-              <a:rPr lang="en-US" dirty="0"/>
-              <a:t> e </a:t>
-            </a:r>
-            <a:r>
-              <a:rPr lang="en-US" dirty="0" err="1"/>
-              <a:t>razionale</a:t>
-            </a:r>
-            <a:r>
-              <a:rPr lang="en-US" dirty="0"/>
-              <a:t> del </a:t>
-            </a:r>
-            <a:r>
-              <a:rPr lang="en-US" dirty="0" err="1"/>
-              <a:t>metodo</a:t>
-            </a:r>
-            <a:r>
-              <a:rPr lang="en-US" dirty="0"/>
+              <a:rPr lang="en-US" sz="1700" dirty="0" err="1"/>
+              <a:t>intenso</a:t>
+            </a:r>
+            <a:r>
+              <a:rPr lang="en-US" sz="1700" dirty="0"/>
+              <a:t> sui </a:t>
+            </a:r>
+            <a:r>
+              <a:rPr lang="en-US" sz="1700" dirty="0" err="1"/>
+              <a:t>voti</a:t>
+            </a:r>
+            <a:r>
+              <a:rPr lang="en-US" sz="1700" dirty="0"/>
               <a:t> </a:t>
             </a:r>
             <a:r>
-              <a:rPr lang="en-US" dirty="0" err="1"/>
-              <a:t>precedente</a:t>
-            </a:r>
-            <a:r>
-              <a:rPr lang="en-US" dirty="0"/>
+              <a:rPr lang="en-US" sz="1700" dirty="0" err="1"/>
+              <a:t>più</a:t>
+            </a:r>
+            <a:r>
+              <a:rPr lang="en-US" sz="1700" dirty="0"/>
+              <a:t> </a:t>
+            </a:r>
+            <a:r>
+              <a:rPr lang="en-US" sz="1700" dirty="0" err="1"/>
+              <a:t>frequenti</a:t>
+            </a:r>
+            <a:r>
+              <a:rPr lang="en-US" sz="1700" dirty="0"/>
               <a:t>.</a:t>
             </a:r>
           </a:p>
@@ -7322,7 +7680,7 @@
           <p:cNvPr id="4" name="Segnaposto piè di pagina 3">
             <a:extLst>
               <a:ext uri="{FF2B5EF4-FFF2-40B4-BE49-F238E27FC236}">
-                <a16:creationId xmlns:a16="http://schemas.microsoft.com/office/drawing/2014/main" id="{0248CED7-F4F3-4A2D-87D7-228D3065DF5B}"/>
+                <a16:creationId xmlns:a16="http://schemas.microsoft.com/office/drawing/2014/main" id="{B2A817F3-33C6-486B-9E98-AE59A70529A3}"/>
               </a:ext>
             </a:extLst>
           </p:cNvPr>
@@ -7362,7 +7720,7 @@
           <p:cNvPr id="5" name="Segnaposto numero diapositiva 4">
             <a:extLst>
               <a:ext uri="{FF2B5EF4-FFF2-40B4-BE49-F238E27FC236}">
-                <a16:creationId xmlns:a16="http://schemas.microsoft.com/office/drawing/2014/main" id="{5210B947-44AB-4190-BD09-461600FCADCE}"/>
+                <a16:creationId xmlns:a16="http://schemas.microsoft.com/office/drawing/2014/main" id="{8FBE361A-D4E5-4F90-881B-6F1E6EC0A2A9}"/>
               </a:ext>
             </a:extLst>
           </p:cNvPr>
@@ -7397,7 +7755,7 @@
                   <a:spcPts val="600"/>
                 </a:spcAft>
               </a:pPr>
-              <a:t>6</a:t>
+              <a:t>7</a:t>
             </a:fld>
             <a:endParaRPr lang="it-IT"/>
           </a:p>
@@ -7406,254 +7764,7 @@
     </p:spTree>
     <p:extLst>
       <p:ext uri="{BB962C8B-B14F-4D97-AF65-F5344CB8AC3E}">
-        <p14:creationId xmlns:p14="http://schemas.microsoft.com/office/powerpoint/2010/main" val="3908619891"/>
-      </p:ext>
-    </p:extLst>
-  </p:cSld>
-  <p:clrMapOvr>
-    <a:masterClrMapping/>
-  </p:clrMapOvr>
-</p:sld>
-</file>
-
-<file path=ppt/slides/slide7.xml><?xml version="1.0" encoding="utf-8"?>
-<p:sld xmlns:a="http://schemas.openxmlformats.org/drawingml/2006/main" xmlns:r="http://schemas.openxmlformats.org/officeDocument/2006/relationships" xmlns:p="http://schemas.openxmlformats.org/presentationml/2006/main">
-  <p:cSld>
-    <p:spTree>
-      <p:nvGrpSpPr>
-        <p:cNvPr id="1" name=""/>
-        <p:cNvGrpSpPr/>
-        <p:nvPr/>
-      </p:nvGrpSpPr>
-      <p:grpSpPr>
-        <a:xfrm>
-          <a:off x="0" y="0"/>
-          <a:ext cx="0" cy="0"/>
-          <a:chOff x="0" y="0"/>
-          <a:chExt cx="0" cy="0"/>
-        </a:xfrm>
-      </p:grpSpPr>
-      <p:sp>
-        <p:nvSpPr>
-          <p:cNvPr id="2" name="Titolo 1">
-            <a:extLst>
-              <a:ext uri="{FF2B5EF4-FFF2-40B4-BE49-F238E27FC236}">
-                <a16:creationId xmlns:a16="http://schemas.microsoft.com/office/drawing/2014/main" id="{238B2D5E-DD10-453A-AF76-4ABCED915F4B}"/>
-              </a:ext>
-            </a:extLst>
-          </p:cNvPr>
-          <p:cNvSpPr>
-            <a:spLocks noGrp="1"/>
-          </p:cNvSpPr>
-          <p:nvPr>
-            <p:ph type="title"/>
-          </p:nvPr>
-        </p:nvSpPr>
-        <p:spPr/>
-        <p:txBody>
-          <a:bodyPr/>
-          <a:lstStyle/>
-          <a:p>
-            <a:r>
-              <a:rPr lang="it-IT" dirty="0"/>
-              <a:t>La media di </a:t>
-            </a:r>
-            <a:r>
-              <a:rPr lang="it-IT" dirty="0" err="1"/>
-              <a:t>Bayes</a:t>
-            </a:r>
-            <a:endParaRPr lang="it-IT" dirty="0"/>
-          </a:p>
-        </p:txBody>
-      </p:sp>
-      <p:sp>
-        <p:nvSpPr>
-          <p:cNvPr id="4" name="Segnaposto piè di pagina 3">
-            <a:extLst>
-              <a:ext uri="{FF2B5EF4-FFF2-40B4-BE49-F238E27FC236}">
-                <a16:creationId xmlns:a16="http://schemas.microsoft.com/office/drawing/2014/main" id="{8C6EC825-8141-41C7-9311-6C7513C0EDE9}"/>
-              </a:ext>
-            </a:extLst>
-          </p:cNvPr>
-          <p:cNvSpPr>
-            <a:spLocks noGrp="1"/>
-          </p:cNvSpPr>
-          <p:nvPr>
-            <p:ph type="ftr" sz="quarter" idx="11"/>
-          </p:nvPr>
-        </p:nvSpPr>
-        <p:spPr/>
-        <p:txBody>
-          <a:bodyPr/>
-          <a:lstStyle/>
-          <a:p>
-            <a:r>
-              <a:rPr lang="it-IT"/>
-              <a:t>Andrea Foroni, Marco Morandi, Prabin Pellicioli</a:t>
-            </a:r>
-          </a:p>
-        </p:txBody>
-      </p:sp>
-      <p:sp>
-        <p:nvSpPr>
-          <p:cNvPr id="5" name="Segnaposto numero diapositiva 4">
-            <a:extLst>
-              <a:ext uri="{FF2B5EF4-FFF2-40B4-BE49-F238E27FC236}">
-                <a16:creationId xmlns:a16="http://schemas.microsoft.com/office/drawing/2014/main" id="{0208920B-A89F-4037-9568-4FCCF69DC953}"/>
-              </a:ext>
-            </a:extLst>
-          </p:cNvPr>
-          <p:cNvSpPr>
-            <a:spLocks noGrp="1"/>
-          </p:cNvSpPr>
-          <p:nvPr>
-            <p:ph type="sldNum" sz="quarter" idx="12"/>
-          </p:nvPr>
-        </p:nvSpPr>
-        <p:spPr/>
-        <p:txBody>
-          <a:bodyPr/>
-          <a:lstStyle/>
-          <a:p>
-            <a:fld id="{DAB7ABF3-6289-4E10-AC32-6085271221DA}" type="slidenum">
-              <a:rPr lang="it-IT" smtClean="0"/>
-              <a:t>7</a:t>
-            </a:fld>
-            <a:endParaRPr lang="it-IT"/>
-          </a:p>
-        </p:txBody>
-      </p:sp>
-      <p:pic>
-        <p:nvPicPr>
-          <p:cNvPr id="30" name="Segnaposto contenuto 29" descr="Immagine che contiene testo&#10;&#10;Descrizione generata automaticamente">
-            <a:extLst>
-              <a:ext uri="{FF2B5EF4-FFF2-40B4-BE49-F238E27FC236}">
-                <a16:creationId xmlns:a16="http://schemas.microsoft.com/office/drawing/2014/main" id="{F1972ED6-6023-4E88-ACAF-48E277E26E39}"/>
-              </a:ext>
-            </a:extLst>
-          </p:cNvPr>
-          <p:cNvPicPr>
-            <a:picLocks noGrp="1" noChangeAspect="1"/>
-          </p:cNvPicPr>
-          <p:nvPr>
-            <p:ph idx="1"/>
-          </p:nvPr>
-        </p:nvPicPr>
-        <p:blipFill>
-          <a:blip r:embed="rId2">
-            <a:extLst>
-              <a:ext uri="{28A0092B-C50C-407E-A947-70E740481C1C}">
-                <a14:useLocalDpi xmlns:a14="http://schemas.microsoft.com/office/drawing/2010/main" val="0"/>
-              </a:ext>
-            </a:extLst>
-          </a:blip>
-          <a:stretch>
-            <a:fillRect/>
-          </a:stretch>
-        </p:blipFill>
-        <p:spPr>
-          <a:xfrm>
-            <a:off x="4814887" y="1828800"/>
-            <a:ext cx="2562225" cy="685800"/>
-          </a:xfrm>
-        </p:spPr>
-      </p:pic>
-      <p:sp>
-        <p:nvSpPr>
-          <p:cNvPr id="31" name="CasellaDiTesto 30">
-            <a:extLst>
-              <a:ext uri="{FF2B5EF4-FFF2-40B4-BE49-F238E27FC236}">
-                <a16:creationId xmlns:a16="http://schemas.microsoft.com/office/drawing/2014/main" id="{4DCFF8F9-6E11-4341-8772-C096E3B26B94}"/>
-              </a:ext>
-            </a:extLst>
-          </p:cNvPr>
-          <p:cNvSpPr txBox="1"/>
-          <p:nvPr/>
-        </p:nvSpPr>
-        <p:spPr>
-          <a:xfrm>
-            <a:off x="1371600" y="2912013"/>
-            <a:ext cx="10592578" cy="2862322"/>
-          </a:xfrm>
-          <a:prstGeom prst="rect">
-            <a:avLst/>
-          </a:prstGeom>
-          <a:noFill/>
-        </p:spPr>
-        <p:txBody>
-          <a:bodyPr wrap="square" rtlCol="0">
-            <a:spAutoFit/>
-          </a:bodyPr>
-          <a:lstStyle/>
-          <a:p>
-            <a:r>
-              <a:rPr lang="it-IT" dirty="0"/>
-              <a:t>C = confidence (è il minimo numero di commenti che rende affidabile la valutazione)</a:t>
-            </a:r>
-          </a:p>
-          <a:p>
-            <a:r>
-              <a:rPr lang="it-IT" dirty="0"/>
-              <a:t>m = </a:t>
-            </a:r>
-            <a:r>
-              <a:rPr lang="it-IT" dirty="0" err="1"/>
-              <a:t>prior</a:t>
-            </a:r>
-            <a:r>
-              <a:rPr lang="it-IT" dirty="0"/>
-              <a:t> (è il voto medio scelto a priori che ci si aspetta nel dataset)</a:t>
-            </a:r>
-          </a:p>
-          <a:p>
-            <a:r>
-              <a:rPr lang="it-IT" dirty="0"/>
-              <a:t>N = numero di commenti</a:t>
-            </a:r>
-          </a:p>
-          <a:p>
-            <a:endParaRPr lang="it-IT" dirty="0"/>
-          </a:p>
-          <a:p>
-            <a:r>
-              <a:rPr lang="it-IT" dirty="0"/>
-              <a:t>Con la media di </a:t>
-            </a:r>
-            <a:r>
-              <a:rPr lang="it-IT" dirty="0" err="1"/>
-              <a:t>Bayes</a:t>
-            </a:r>
-            <a:r>
-              <a:rPr lang="it-IT" dirty="0"/>
-              <a:t> se il numero di commenti è minore di C, la media osservata è fortemente influenzata da m (</a:t>
-            </a:r>
-            <a:r>
-              <a:rPr lang="it-IT" dirty="0" err="1"/>
-              <a:t>prior</a:t>
-            </a:r>
-            <a:r>
-              <a:rPr lang="it-IT" dirty="0"/>
-              <a:t>) se invece è maggiore, la media osservata è più importante.</a:t>
-            </a:r>
-          </a:p>
-          <a:p>
-            <a:r>
-              <a:rPr lang="it-IT" dirty="0"/>
-              <a:t>Per fare in modo che la media sia veritiera bisogna scegliere accuratamente C e m, per il nostro ranking è stato scelto C=30; m=6.3</a:t>
-            </a:r>
-          </a:p>
-          <a:p>
-            <a:endParaRPr lang="it-IT" dirty="0"/>
-          </a:p>
-          <a:p>
-            <a:endParaRPr lang="it-IT" dirty="0"/>
-          </a:p>
-        </p:txBody>
-      </p:sp>
-    </p:spTree>
-    <p:extLst>
-      <p:ext uri="{BB962C8B-B14F-4D97-AF65-F5344CB8AC3E}">
-        <p14:creationId xmlns:p14="http://schemas.microsoft.com/office/powerpoint/2010/main" val="3799362411"/>
+        <p14:creationId xmlns:p14="http://schemas.microsoft.com/office/powerpoint/2010/main" val="2209731725"/>
       </p:ext>
     </p:extLst>
   </p:cSld>
@@ -7693,7 +7804,7 @@
           <p:cNvPr id="2" name="Titolo 1">
             <a:extLst>
               <a:ext uri="{FF2B5EF4-FFF2-40B4-BE49-F238E27FC236}">
-                <a16:creationId xmlns:a16="http://schemas.microsoft.com/office/drawing/2014/main" id="{5B345DEA-7D85-4715-9B4D-A787A114128A}"/>
+                <a16:creationId xmlns:a16="http://schemas.microsoft.com/office/drawing/2014/main" id="{73181F96-ED8F-4515-BC2B-D072B682922D}"/>
               </a:ext>
             </a:extLst>
           </p:cNvPr>
@@ -7717,14 +7828,14 @@
           <a:lstStyle/>
           <a:p>
             <a:r>
-              <a:rPr lang="it-IT" sz="3400"/>
-              <a:t>Scelta della confidence e </a:t>
-            </a:r>
-            <a:r>
-              <a:rPr lang="it-IT" sz="3400" err="1"/>
-              <a:t>prior</a:t>
-            </a:r>
-            <a:endParaRPr lang="it-IT" sz="3400"/>
+              <a:rPr lang="it-IT" sz="4100" dirty="0"/>
+              <a:t>Ranking con media di </a:t>
+            </a:r>
+            <a:r>
+              <a:rPr lang="it-IT" sz="4100" dirty="0" err="1"/>
+              <a:t>Bayes</a:t>
+            </a:r>
+            <a:endParaRPr lang="it-IT" sz="4100" dirty="0"/>
           </a:p>
         </p:txBody>
       </p:sp>
@@ -7785,10 +7896,10 @@
       </p:sp>
       <p:pic>
         <p:nvPicPr>
-          <p:cNvPr id="7" name="Segnaposto contenuto 6">
+          <p:cNvPr id="7" name="Segnaposto contenuto 6" descr="Immagine che contiene tavolo&#10;&#10;Descrizione generata automaticamente">
             <a:extLst>
               <a:ext uri="{FF2B5EF4-FFF2-40B4-BE49-F238E27FC236}">
-                <a16:creationId xmlns:a16="http://schemas.microsoft.com/office/drawing/2014/main" id="{488EFED7-8438-44DC-974B-85E5AA36BA70}"/>
+                <a16:creationId xmlns:a16="http://schemas.microsoft.com/office/drawing/2014/main" id="{012DD890-49DD-4C8D-9105-4E8280BBC5E8}"/>
               </a:ext>
             </a:extLst>
           </p:cNvPr>
@@ -7811,8 +7922,8 @@
         </p:blipFill>
         <p:spPr>
           <a:xfrm>
-            <a:off x="1023561" y="1102357"/>
-            <a:ext cx="6517065" cy="4333245"/>
+            <a:off x="1023561" y="1158999"/>
+            <a:ext cx="6517065" cy="4219961"/>
           </a:xfrm>
           <a:prstGeom prst="rect">
             <a:avLst/>
@@ -7824,7 +7935,7 @@
           <p:cNvPr id="11" name="Content Placeholder 10">
             <a:extLst>
               <a:ext uri="{FF2B5EF4-FFF2-40B4-BE49-F238E27FC236}">
-                <a16:creationId xmlns:a16="http://schemas.microsoft.com/office/drawing/2014/main" id="{81A25C7D-4D64-46A2-8CBF-D0C35C3D145D}"/>
+                <a16:creationId xmlns:a16="http://schemas.microsoft.com/office/drawing/2014/main" id="{ED706131-CF59-481C-AD37-922B3DE30C3B}"/>
               </a:ext>
             </a:extLst>
           </p:cNvPr>
@@ -7837,13 +7948,13 @@
         </p:nvSpPr>
         <p:spPr>
           <a:xfrm>
-            <a:off x="7857492" y="1989085"/>
-            <a:ext cx="3656419" cy="3955409"/>
+            <a:off x="7860667" y="2286000"/>
+            <a:ext cx="3656419" cy="3581400"/>
           </a:xfrm>
         </p:spPr>
         <p:txBody>
           <a:bodyPr>
-            <a:noAutofit/>
+            <a:normAutofit/>
           </a:bodyPr>
           <a:lstStyle/>
           <a:p>
@@ -7851,270 +7962,159 @@
               <a:buNone/>
             </a:pPr>
             <a:r>
-              <a:rPr lang="en-US" sz="1700" dirty="0"/>
-              <a:t>La </a:t>
-            </a:r>
-            <a:r>
-              <a:rPr lang="en-US" sz="1700" dirty="0" err="1"/>
-              <a:t>scelta</a:t>
-            </a:r>
-            <a:r>
-              <a:rPr lang="en-US" sz="1700" dirty="0"/>
-              <a:t> è </a:t>
-            </a:r>
-            <a:r>
-              <a:rPr lang="en-US" sz="1700" dirty="0" err="1"/>
-              <a:t>stata</a:t>
-            </a:r>
-            <a:r>
-              <a:rPr lang="en-US" sz="1700" dirty="0"/>
+              <a:rPr lang="en-US" dirty="0"/>
+              <a:t>Con </a:t>
+            </a:r>
+            <a:r>
+              <a:rPr lang="en-US" dirty="0" err="1"/>
+              <a:t>questo</a:t>
+            </a:r>
+            <a:r>
+              <a:rPr lang="en-US" dirty="0"/>
               <a:t> </a:t>
             </a:r>
             <a:r>
-              <a:rPr lang="en-US" sz="1700" dirty="0" err="1"/>
-              <a:t>fatta</a:t>
-            </a:r>
-            <a:r>
-              <a:rPr lang="en-US" sz="1700" dirty="0"/>
+              <a:rPr lang="en-US" dirty="0" err="1"/>
+              <a:t>metodo</a:t>
+            </a:r>
+            <a:r>
+              <a:rPr lang="en-US" dirty="0"/>
               <a:t> </a:t>
             </a:r>
             <a:r>
-              <a:rPr lang="en-US" sz="1700" dirty="0" err="1"/>
-              <a:t>utilizzando</a:t>
-            </a:r>
-            <a:r>
-              <a:rPr lang="en-US" sz="1700" dirty="0"/>
-              <a:t> il </a:t>
-            </a:r>
-            <a:r>
-              <a:rPr lang="en-US" sz="1700" dirty="0" err="1"/>
-              <a:t>grafico</a:t>
-            </a:r>
-            <a:r>
-              <a:rPr lang="en-US" sz="1700" dirty="0"/>
-              <a:t> di </a:t>
-            </a:r>
-            <a:r>
-              <a:rPr lang="en-US" sz="1700" dirty="0" err="1"/>
-              <a:t>frequenza</a:t>
-            </a:r>
-            <a:r>
-              <a:rPr lang="en-US" sz="1700" dirty="0"/>
+              <a:rPr lang="en-US" dirty="0" err="1"/>
+              <a:t>si</a:t>
+            </a:r>
+            <a:r>
+              <a:rPr lang="en-US" dirty="0"/>
               <a:t> </a:t>
             </a:r>
             <a:r>
-              <a:rPr lang="en-US" sz="1700" dirty="0" err="1"/>
-              <a:t>delle</a:t>
-            </a:r>
-            <a:r>
-              <a:rPr lang="en-US" sz="1700" dirty="0"/>
+              <a:rPr lang="en-US" dirty="0" err="1"/>
+              <a:t>considerano</a:t>
+            </a:r>
+            <a:r>
+              <a:rPr lang="en-US" dirty="0"/>
               <a:t> </a:t>
             </a:r>
             <a:r>
-              <a:rPr lang="en-US" sz="1700" dirty="0" err="1"/>
-              <a:t>medie</a:t>
-            </a:r>
-            <a:r>
-              <a:rPr lang="en-US" sz="1700" dirty="0"/>
+              <a:rPr lang="en-US" dirty="0" err="1"/>
+              <a:t>sia</a:t>
+            </a:r>
+            <a:r>
+              <a:rPr lang="en-US" dirty="0"/>
               <a:t> </a:t>
             </a:r>
             <a:r>
-              <a:rPr lang="en-US" sz="1700" dirty="0" err="1"/>
+              <a:rPr lang="en-US" dirty="0" err="1"/>
+              <a:t>i</a:t>
+            </a:r>
+            <a:r>
+              <a:rPr lang="en-US" dirty="0"/>
+              <a:t> rating </a:t>
+            </a:r>
+            <a:r>
+              <a:rPr lang="en-US" dirty="0" err="1"/>
               <a:t>dei</a:t>
             </a:r>
             <a:r>
-              <a:rPr lang="en-US" sz="1700" dirty="0"/>
-              <a:t> rating in base ai </a:t>
-            </a:r>
-            <a:r>
-              <a:rPr lang="en-US" sz="1700" dirty="0" err="1"/>
+              <a:rPr lang="en-US" dirty="0"/>
+              <a:t> </a:t>
+            </a:r>
+            <a:r>
+              <a:rPr lang="en-US" dirty="0" err="1"/>
               <a:t>giochi</a:t>
             </a:r>
             <a:r>
-              <a:rPr lang="en-US" sz="1700" dirty="0"/>
-              <a:t>.</a:t>
-            </a:r>
-          </a:p>
-          <a:p>
-            <a:pPr marL="0" indent="0">
-              <a:buNone/>
-            </a:pPr>
-            <a:r>
-              <a:rPr lang="en-US" sz="1700" dirty="0" err="1"/>
-              <a:t>Sull’asse</a:t>
-            </a:r>
-            <a:r>
-              <a:rPr lang="en-US" sz="1700" dirty="0"/>
-              <a:t> x il </a:t>
-            </a:r>
-            <a:r>
-              <a:rPr lang="en-US" sz="1700" dirty="0" err="1"/>
-              <a:t>numero</a:t>
-            </a:r>
-            <a:r>
-              <a:rPr lang="en-US" sz="1700" dirty="0"/>
-              <a:t> di </a:t>
-            </a:r>
-            <a:r>
-              <a:rPr lang="en-US" sz="1700" dirty="0" err="1"/>
-              <a:t>recensioni</a:t>
-            </a:r>
-            <a:r>
-              <a:rPr lang="en-US" sz="1700" dirty="0"/>
-              <a:t>.</a:t>
-            </a:r>
-          </a:p>
-          <a:p>
-            <a:pPr marL="0" indent="0">
-              <a:buNone/>
-            </a:pPr>
-            <a:r>
-              <a:rPr lang="en-US" sz="1700" dirty="0" err="1"/>
-              <a:t>Sull’asse</a:t>
-            </a:r>
-            <a:r>
-              <a:rPr lang="en-US" sz="1700" dirty="0"/>
-              <a:t> y il </a:t>
-            </a:r>
-            <a:r>
-              <a:rPr lang="en-US" sz="1700" dirty="0" err="1"/>
-              <a:t>numero</a:t>
-            </a:r>
-            <a:r>
-              <a:rPr lang="en-US" sz="1700" dirty="0"/>
-              <a:t> di </a:t>
-            </a:r>
-            <a:r>
-              <a:rPr lang="en-US" sz="1700" dirty="0" err="1"/>
-              <a:t>voti</a:t>
-            </a:r>
-            <a:r>
-              <a:rPr lang="en-US" sz="1700" dirty="0"/>
+              <a:rPr lang="en-US" dirty="0"/>
               <a:t> </a:t>
             </a:r>
             <a:r>
-              <a:rPr lang="en-US" sz="1700" dirty="0" err="1"/>
-              <a:t>delle</a:t>
-            </a:r>
-            <a:r>
-              <a:rPr lang="en-US" sz="1700" dirty="0"/>
+              <a:rPr lang="en-US" dirty="0" err="1"/>
+              <a:t>che</a:t>
+            </a:r>
+            <a:r>
+              <a:rPr lang="en-US" dirty="0"/>
+              <a:t> la </a:t>
+            </a:r>
+            <a:r>
+              <a:rPr lang="en-US" dirty="0" err="1"/>
+              <a:t>numerosità</a:t>
+            </a:r>
+            <a:r>
+              <a:rPr lang="en-US" dirty="0"/>
               <a:t> </a:t>
             </a:r>
             <a:r>
-              <a:rPr lang="en-US" sz="1700" dirty="0" err="1"/>
-              <a:t>recensioni</a:t>
-            </a:r>
-            <a:r>
-              <a:rPr lang="en-US" sz="1700" dirty="0"/>
-              <a:t>.</a:t>
-            </a:r>
-          </a:p>
-          <a:p>
-            <a:pPr marL="0" indent="0">
-              <a:buNone/>
-            </a:pPr>
-            <a:r>
-              <a:rPr lang="en-US" sz="1700" dirty="0" err="1"/>
-              <a:t>Gli</a:t>
-            </a:r>
-            <a:r>
-              <a:rPr lang="en-US" sz="1700" dirty="0"/>
+              <a:rPr lang="en-US" dirty="0" err="1"/>
+              <a:t>dei</a:t>
+            </a:r>
+            <a:r>
+              <a:rPr lang="en-US" dirty="0"/>
               <a:t> </a:t>
             </a:r>
             <a:r>
-              <a:rPr lang="en-US" sz="1700" dirty="0" err="1"/>
-              <a:t>esagoni</a:t>
-            </a:r>
-            <a:r>
-              <a:rPr lang="en-US" sz="1700" dirty="0"/>
+              <a:rPr lang="en-US" dirty="0" err="1"/>
+              <a:t>commenti</a:t>
+            </a:r>
+            <a:r>
+              <a:rPr lang="en-US" dirty="0"/>
+              <a:t>, </a:t>
+            </a:r>
+            <a:r>
+              <a:rPr lang="en-US" dirty="0" err="1"/>
+              <a:t>risultando</a:t>
+            </a:r>
+            <a:r>
+              <a:rPr lang="en-US" dirty="0"/>
               <a:t> </a:t>
             </a:r>
             <a:r>
-              <a:rPr lang="en-US" sz="1700" dirty="0" err="1"/>
-              <a:t>vanno</a:t>
-            </a:r>
-            <a:r>
-              <a:rPr lang="en-US" sz="1700" dirty="0"/>
-              <a:t> dal </a:t>
-            </a:r>
-            <a:r>
-              <a:rPr lang="en-US" sz="1700" dirty="0" err="1"/>
-              <a:t>giallo</a:t>
-            </a:r>
-            <a:r>
-              <a:rPr lang="en-US" sz="1700" dirty="0"/>
-              <a:t> al </a:t>
-            </a:r>
-            <a:r>
-              <a:rPr lang="en-US" sz="1700" dirty="0" err="1"/>
-              <a:t>verde</a:t>
-            </a:r>
-            <a:r>
-              <a:rPr lang="en-US" sz="1700" dirty="0"/>
-              <a:t> al </a:t>
-            </a:r>
-            <a:r>
-              <a:rPr lang="en-US" sz="1700" dirty="0" err="1"/>
-              <a:t>blu</a:t>
-            </a:r>
-            <a:r>
-              <a:rPr lang="en-US" sz="1700" dirty="0"/>
-              <a:t> e il </a:t>
-            </a:r>
-            <a:r>
-              <a:rPr lang="en-US" sz="1700" dirty="0" err="1"/>
-              <a:t>colore</a:t>
-            </a:r>
-            <a:r>
-              <a:rPr lang="en-US" sz="1700" dirty="0"/>
+              <a:rPr lang="en-US" dirty="0" err="1"/>
+              <a:t>così</a:t>
+            </a:r>
+            <a:r>
+              <a:rPr lang="en-US" dirty="0"/>
               <a:t> </a:t>
             </a:r>
             <a:r>
-              <a:rPr lang="en-US" sz="1700" dirty="0" err="1"/>
-              <a:t>diventa</a:t>
-            </a:r>
-            <a:r>
-              <a:rPr lang="en-US" sz="1700" dirty="0"/>
+              <a:rPr lang="en-US" dirty="0" err="1"/>
+              <a:t>più</a:t>
+            </a:r>
+            <a:r>
+              <a:rPr lang="en-US" dirty="0"/>
               <a:t> </a:t>
             </a:r>
             <a:r>
-              <a:rPr lang="en-US" sz="1700" dirty="0" err="1"/>
-              <a:t>più</a:t>
-            </a:r>
-            <a:r>
-              <a:rPr lang="en-US" sz="1700" dirty="0"/>
+              <a:rPr lang="en-US" dirty="0" err="1"/>
+              <a:t>accettabile</a:t>
+            </a:r>
+            <a:r>
+              <a:rPr lang="en-US" dirty="0"/>
+              <a:t> e </a:t>
+            </a:r>
+            <a:r>
+              <a:rPr lang="en-US" dirty="0" err="1"/>
+              <a:t>razionale</a:t>
+            </a:r>
+            <a:r>
+              <a:rPr lang="en-US" dirty="0"/>
+              <a:t> del </a:t>
+            </a:r>
+            <a:r>
+              <a:rPr lang="en-US" dirty="0" err="1"/>
+              <a:t>metodo</a:t>
+            </a:r>
+            <a:r>
+              <a:rPr lang="en-US" dirty="0"/>
               <a:t> </a:t>
             </a:r>
             <a:r>
-              <a:rPr lang="en-US" sz="1700" dirty="0" err="1"/>
-              <a:t>intenso</a:t>
-            </a:r>
-            <a:r>
-              <a:rPr lang="en-US" sz="1700" dirty="0"/>
-              <a:t> sui </a:t>
-            </a:r>
-            <a:r>
-              <a:rPr lang="en-US" sz="1700" dirty="0" err="1"/>
-              <a:t>voti</a:t>
-            </a:r>
-            <a:r>
-              <a:rPr lang="en-US" sz="1700" dirty="0"/>
-              <a:t> </a:t>
-            </a:r>
-            <a:r>
-              <a:rPr lang="en-US" sz="1700" dirty="0" err="1"/>
-              <a:t>più</a:t>
-            </a:r>
-            <a:r>
-              <a:rPr lang="en-US" sz="1700" dirty="0"/>
-              <a:t> </a:t>
-            </a:r>
-            <a:r>
-              <a:rPr lang="en-US" sz="1700" dirty="0" err="1"/>
-              <a:t>frequenti</a:t>
-            </a:r>
-            <a:r>
-              <a:rPr lang="en-US" sz="1700" dirty="0"/>
+              <a:rPr lang="en-US" dirty="0" err="1"/>
+              <a:t>precedente</a:t>
+            </a:r>
+            <a:r>
+              <a:rPr lang="en-US" dirty="0"/>
               <a:t>.</a:t>
             </a:r>
           </a:p>
@@ -8125,7 +8125,7 @@
           <p:cNvPr id="4" name="Segnaposto piè di pagina 3">
             <a:extLst>
               <a:ext uri="{FF2B5EF4-FFF2-40B4-BE49-F238E27FC236}">
-                <a16:creationId xmlns:a16="http://schemas.microsoft.com/office/drawing/2014/main" id="{B2A817F3-33C6-486B-9E98-AE59A70529A3}"/>
+                <a16:creationId xmlns:a16="http://schemas.microsoft.com/office/drawing/2014/main" id="{0248CED7-F4F3-4A2D-87D7-228D3065DF5B}"/>
               </a:ext>
             </a:extLst>
           </p:cNvPr>
@@ -8165,7 +8165,7 @@
           <p:cNvPr id="5" name="Segnaposto numero diapositiva 4">
             <a:extLst>
               <a:ext uri="{FF2B5EF4-FFF2-40B4-BE49-F238E27FC236}">
-                <a16:creationId xmlns:a16="http://schemas.microsoft.com/office/drawing/2014/main" id="{8FBE361A-D4E5-4F90-881B-6F1E6EC0A2A9}"/>
+                <a16:creationId xmlns:a16="http://schemas.microsoft.com/office/drawing/2014/main" id="{5210B947-44AB-4190-BD09-461600FCADCE}"/>
               </a:ext>
             </a:extLst>
           </p:cNvPr>
@@ -8209,7 +8209,7 @@
     </p:spTree>
     <p:extLst>
       <p:ext uri="{BB962C8B-B14F-4D97-AF65-F5344CB8AC3E}">
-        <p14:creationId xmlns:p14="http://schemas.microsoft.com/office/powerpoint/2010/main" val="2209731725"/>
+        <p14:creationId xmlns:p14="http://schemas.microsoft.com/office/powerpoint/2010/main" val="3908619891"/>
       </p:ext>
     </p:extLst>
   </p:cSld>

</xml_diff>